<commit_message>
Chapter 13, Sections 3-4 PowerPoint Slides 13 - Subprograms, 17-42
</commit_message>
<xml_diff>
--- a/PowerPoints/13 - Subprograms.pptx
+++ b/PowerPoints/13 - Subprograms.pptx
@@ -38840,19 +38840,7 @@
               <a:rPr lang="en-US" sz="1800" dirty="0">
                 <a:latin typeface="Consolas" panose="020B0609020204030204" pitchFamily="49" charset="0"/>
               </a:rPr>
-              <a:t>, </a:t>
-            </a:r>
-            <a:r>
-              <a:rPr lang="en-US" sz="1800" dirty="0" err="1">
-                <a:latin typeface="Consolas" panose="020B0609020204030204" pitchFamily="49" charset="0"/>
-              </a:rPr>
-              <a:t>initialValue</a:t>
-            </a:r>
-            <a:r>
-              <a:rPr lang="en-US" sz="1800" dirty="0">
-                <a:latin typeface="Consolas" panose="020B0609020204030204" pitchFamily="49" charset="0"/>
-              </a:rPr>
-              <a:t>,</a:t>
+              <a:t>, initializer,</a:t>
             </a:r>
             <a:br>
               <a:rPr lang="en-US" sz="1800" dirty="0">
@@ -38872,11 +38860,14 @@
               <a:t>idTable.scopeLevel</a:t>
             </a:r>
             <a:r>
-              <a:rPr lang="en-US" sz="1800" dirty="0">
+              <a:rPr lang="en-US" sz="1800">
                 <a:latin typeface="Consolas" panose="020B0609020204030204" pitchFamily="49" charset="0"/>
               </a:rPr>
               <a:t>)</a:t>
             </a:r>
+            <a:endParaRPr lang="en-US" sz="1800" dirty="0">
+              <a:latin typeface="Consolas" panose="020B0609020204030204" pitchFamily="49" charset="0"/>
+            </a:endParaRPr>
           </a:p>
           <a:p>
             <a:r>

</xml_diff>